<commit_message>
Update ppt template colors and license
</commit_message>
<xml_diff>
--- a/bakery-src/scripts/ppt/custom-reference-en.pptx
+++ b/bakery-src/scripts/ppt/custom-reference-en.pptx
@@ -226,7 +226,7 @@
           <a:p>
             <a:fld id="{34B6F1DD-7B1C-8B4B-8F23-33B6B81846C2}" type="datetimeFigureOut">
               <a:rPr lang="en-US" smtClean="0"/>
-              <a:t>7/25/24</a:t>
+              <a:t>2/16/26</a:t>
             </a:fld>
             <a:endParaRPr lang="en-US"/>
           </a:p>
@@ -404,7 +404,7 @@
           <a:p>
             <a:fld id="{0F9C1CCF-B725-44A7-AA57-5E433BD85C9F}" type="datetimeFigureOut">
               <a:rPr lang="en-US" smtClean="0"/>
-              <a:t>7/25/24</a:t>
+              <a:t>2/16/26</a:t>
             </a:fld>
             <a:endParaRPr lang="en-US"/>
           </a:p>
@@ -873,7 +873,7 @@
             <a:lvl1pPr algn="ctr">
               <a:defRPr sz="6000" b="0" i="0" baseline="0">
                 <a:solidFill>
-                  <a:srgbClr val="70AD47"/>
+                  <a:srgbClr val="548235"/>
                 </a:solidFill>
                 <a:latin typeface="+mj-lt"/>
                 <a:cs typeface="Calibri" panose="020F0502020204030204" pitchFamily="34" charset="0"/>
@@ -1211,7 +1211,7 @@
                   <a:noFill/>
                 </a:ln>
                 <a:solidFill>
-                  <a:srgbClr val="DB5935"/>
+                  <a:srgbClr val="D04925"/>
                 </a:solidFill>
                 <a:effectLst/>
                 <a:uLnTx/>
@@ -1363,9 +1363,22 @@
             <a:normAutofit/>
           </a:bodyPr>
           <a:lstStyle>
-            <a:lvl1pPr marL="0" indent="0" algn="l">
+            <a:lvl1pPr marL="0" marR="0" indent="0" algn="l" defTabSz="457189" rtl="0" eaLnBrk="1" fontAlgn="auto" latinLnBrk="0" hangingPunct="1">
+              <a:lnSpc>
+                <a:spcPct val="100000"/>
+              </a:lnSpc>
+              <a:spcBef>
+                <a:spcPts val="0"/>
+              </a:spcBef>
+              <a:spcAft>
+                <a:spcPts val="0"/>
+              </a:spcAft>
+              <a:buClrTx/>
+              <a:buSzTx/>
+              <a:buFont typeface="Arial" panose="020B0604020202020204" pitchFamily="34" charset="0"/>
               <a:buNone/>
-              <a:defRPr sz="1200">
+              <a:tabLst/>
+              <a:defRPr sz="1200" b="0">
                 <a:solidFill>
                   <a:schemeClr val="tx1"/>
                 </a:solidFill>
@@ -1373,10 +1386,26 @@
             </a:lvl1pPr>
           </a:lstStyle>
           <a:p>
-            <a:pPr algn="l"/>
+            <a:pPr marL="0" marR="0" lvl="0" indent="0" algn="l" defTabSz="457189" rtl="0" eaLnBrk="1" fontAlgn="auto" latinLnBrk="0" hangingPunct="1">
+              <a:lnSpc>
+                <a:spcPct val="100000"/>
+              </a:lnSpc>
+              <a:spcBef>
+                <a:spcPts val="0"/>
+              </a:spcBef>
+              <a:spcAft>
+                <a:spcPts val="0"/>
+              </a:spcAft>
+              <a:buClrTx/>
+              <a:buSzTx/>
+              <a:buFont typeface="Arial" panose="020B0604020202020204" pitchFamily="34" charset="0"/>
+              <a:buNone/>
+              <a:tabLst/>
+              <a:defRPr/>
+            </a:pPr>
             <a:r>
               <a:rPr lang="en-US" dirty="0"/>
-              <a:t>This OpenStax ancillary resource is © Rice University under a CC BY 4.0 International license; it may be reproduced or modified but must be attributed to OpenStax, Rice University and any changes must be noted.</a:t>
+              <a:t>This OpenStax ancillary resource is © Rice University under a CC BY-NC-SA 4.0 International license; it may be reproduced or modified but must be attributed to OpenStax, Rice University and any changes must be noted.</a:t>
             </a:r>
           </a:p>
         </p:txBody>
@@ -1412,7 +1441,7 @@
             <a:lvl1pPr algn="l">
               <a:defRPr sz="2800">
                 <a:solidFill>
-                  <a:srgbClr val="70AD47"/>
+                  <a:srgbClr val="548235"/>
                 </a:solidFill>
               </a:defRPr>
             </a:lvl1pPr>
@@ -1753,7 +1782,7 @@
             <a:lvl1pPr algn="l">
               <a:defRPr sz="2800">
                 <a:solidFill>
-                  <a:srgbClr val="70AD47"/>
+                  <a:srgbClr val="548235"/>
                 </a:solidFill>
               </a:defRPr>
             </a:lvl1pPr>
@@ -1881,7 +1910,7 @@
                   <a:noFill/>
                 </a:ln>
                 <a:solidFill>
-                  <a:srgbClr val="DB5935"/>
+                  <a:srgbClr val="D04925"/>
                 </a:solidFill>
                 <a:effectLst/>
                 <a:uLnTx/>
@@ -2072,7 +2101,7 @@
             <a:lvl1pPr algn="l">
               <a:defRPr sz="4000" b="1" cap="all">
                 <a:solidFill>
-                  <a:srgbClr val="70AD47"/>
+                  <a:srgbClr val="548235"/>
                 </a:solidFill>
               </a:defRPr>
             </a:lvl1pPr>
@@ -2396,7 +2425,7 @@
                   <a:noFill/>
                 </a:ln>
                 <a:solidFill>
-                  <a:srgbClr val="DB5935"/>
+                  <a:srgbClr val="D04925"/>
                 </a:solidFill>
                 <a:effectLst/>
                 <a:uLnTx/>
@@ -2625,7 +2654,7 @@
                   <a:noFill/>
                 </a:ln>
                 <a:solidFill>
-                  <a:srgbClr val="DB5935"/>
+                  <a:srgbClr val="D04925"/>
                 </a:solidFill>
                 <a:effectLst/>
                 <a:uLnTx/>
@@ -2761,7 +2790,7 @@
             <a:lvl1pPr algn="l">
               <a:defRPr sz="2800">
                 <a:solidFill>
-                  <a:srgbClr val="70AD47"/>
+                  <a:srgbClr val="548235"/>
                 </a:solidFill>
               </a:defRPr>
             </a:lvl1pPr>
@@ -3014,7 +3043,7 @@
                   <a:noFill/>
                 </a:ln>
                 <a:solidFill>
-                  <a:srgbClr val="DB5935"/>
+                  <a:srgbClr val="D04925"/>
                 </a:solidFill>
                 <a:effectLst/>
                 <a:uLnTx/>
@@ -3308,7 +3337,7 @@
                   <a:noFill/>
                 </a:ln>
                 <a:solidFill>
-                  <a:srgbClr val="DB5935"/>
+                  <a:srgbClr val="D04925"/>
                 </a:solidFill>
                 <a:effectLst/>
                 <a:uLnTx/>
@@ -3444,7 +3473,7 @@
             <a:lvl1pPr algn="l">
               <a:defRPr sz="2800">
                 <a:solidFill>
-                  <a:srgbClr val="70AD47"/>
+                  <a:srgbClr val="548235"/>
                 </a:solidFill>
               </a:defRPr>
             </a:lvl1pPr>
@@ -3537,7 +3566,7 @@
             <a:lvl1pPr algn="l">
               <a:defRPr sz="2800">
                 <a:solidFill>
-                  <a:srgbClr val="70AD47"/>
+                  <a:srgbClr val="548235"/>
                 </a:solidFill>
               </a:defRPr>
             </a:lvl1pPr>
@@ -3654,7 +3683,7 @@
             <a:lvl1pPr algn="l">
               <a:defRPr sz="2000" b="1">
                 <a:solidFill>
-                  <a:srgbClr val="70AD47"/>
+                  <a:srgbClr val="548235"/>
                 </a:solidFill>
               </a:defRPr>
             </a:lvl1pPr>
@@ -3810,7 +3839,7 @@
                   <a:noFill/>
                 </a:ln>
                 <a:solidFill>
-                  <a:srgbClr val="DB5935"/>
+                  <a:srgbClr val="D04925"/>
                 </a:solidFill>
                 <a:effectLst/>
                 <a:uLnTx/>
@@ -4324,7 +4353,7 @@
                   <a:noFill/>
                 </a:ln>
                 <a:solidFill>
-                  <a:srgbClr val="DB5935"/>
+                  <a:srgbClr val="D04925"/>
                 </a:solidFill>
                 <a:effectLst/>
                 <a:uLnTx/>
@@ -5088,7 +5117,7 @@
         <a:srgbClr val="609A33"/>
       </a:accent1>
       <a:accent2>
-        <a:srgbClr val="DB5935"/>
+        <a:srgbClr val="D04925"/>
       </a:accent2>
       <a:accent3>
         <a:srgbClr val="464846"/>
@@ -5100,7 +5129,7 @@
         <a:srgbClr val="1B1E3F"/>
       </a:accent5>
       <a:accent6>
-        <a:srgbClr val="70AD47"/>
+        <a:srgbClr val="548235"/>
       </a:accent6>
       <a:hlink>
         <a:srgbClr val="29749C"/>
@@ -5420,7 +5449,7 @@
         <a:srgbClr val="4472C4"/>
       </a:accent5>
       <a:accent6>
-        <a:srgbClr val="70AD47"/>
+        <a:srgbClr val="548235"/>
       </a:accent6>
       <a:hlink>
         <a:srgbClr val="0563C1"/>
@@ -5681,7 +5710,7 @@
         <a:srgbClr val="5B9BD5"/>
       </a:accent5>
       <a:accent6>
-        <a:srgbClr val="70AD47"/>
+        <a:srgbClr val="548235"/>
       </a:accent6>
       <a:hlink>
         <a:srgbClr val="0563C1"/>

</xml_diff>

<commit_message>
Update PPT template colors, license, and table alt text (#445)
* Update ppt template colors and license

* Favor summary when getting table alt text in pptify

* Add ppt templates for es and pl

* Add language support for pptx jobs

* Coverage

* Fix xmlstarlet usage

* Use module-level get_string function instead

* :shirt: lint

* Coverage

* Fix lang value handling in step-pptx to trim whitespace and handle empty values

* Enforce i18n key completeness with _make_i18n_entry validator and parametrize test across languages

Add _I18N_KEYS and _make_i18n_entry() to validate that every language entry
has exactly the required keys at import time. Replace hardcoded English
assertions in test_ppt_slide_content with structural checks and dynamic i18n
lookups so the test passes for en, es, and pl.

Co-Authored-By: Claude Opus 4.6 <noreply@anthropic.com>

* Ensure `test_slide_transformations` uses en

---------

Co-authored-by: Claude Opus 4.6 <noreply@anthropic.com>
</commit_message>
<xml_diff>
--- a/bakery-src/scripts/ppt/custom-reference-en.pptx
+++ b/bakery-src/scripts/ppt/custom-reference-en.pptx
@@ -226,7 +226,7 @@
           <a:p>
             <a:fld id="{34B6F1DD-7B1C-8B4B-8F23-33B6B81846C2}" type="datetimeFigureOut">
               <a:rPr lang="en-US" smtClean="0"/>
-              <a:t>7/25/24</a:t>
+              <a:t>2/16/26</a:t>
             </a:fld>
             <a:endParaRPr lang="en-US"/>
           </a:p>
@@ -404,7 +404,7 @@
           <a:p>
             <a:fld id="{0F9C1CCF-B725-44A7-AA57-5E433BD85C9F}" type="datetimeFigureOut">
               <a:rPr lang="en-US" smtClean="0"/>
-              <a:t>7/25/24</a:t>
+              <a:t>2/16/26</a:t>
             </a:fld>
             <a:endParaRPr lang="en-US"/>
           </a:p>
@@ -873,7 +873,7 @@
             <a:lvl1pPr algn="ctr">
               <a:defRPr sz="6000" b="0" i="0" baseline="0">
                 <a:solidFill>
-                  <a:srgbClr val="70AD47"/>
+                  <a:srgbClr val="548235"/>
                 </a:solidFill>
                 <a:latin typeface="+mj-lt"/>
                 <a:cs typeface="Calibri" panose="020F0502020204030204" pitchFamily="34" charset="0"/>
@@ -1211,7 +1211,7 @@
                   <a:noFill/>
                 </a:ln>
                 <a:solidFill>
-                  <a:srgbClr val="DB5935"/>
+                  <a:srgbClr val="D04925"/>
                 </a:solidFill>
                 <a:effectLst/>
                 <a:uLnTx/>
@@ -1363,9 +1363,22 @@
             <a:normAutofit/>
           </a:bodyPr>
           <a:lstStyle>
-            <a:lvl1pPr marL="0" indent="0" algn="l">
+            <a:lvl1pPr marL="0" marR="0" indent="0" algn="l" defTabSz="457189" rtl="0" eaLnBrk="1" fontAlgn="auto" latinLnBrk="0" hangingPunct="1">
+              <a:lnSpc>
+                <a:spcPct val="100000"/>
+              </a:lnSpc>
+              <a:spcBef>
+                <a:spcPts val="0"/>
+              </a:spcBef>
+              <a:spcAft>
+                <a:spcPts val="0"/>
+              </a:spcAft>
+              <a:buClrTx/>
+              <a:buSzTx/>
+              <a:buFont typeface="Arial" panose="020B0604020202020204" pitchFamily="34" charset="0"/>
               <a:buNone/>
-              <a:defRPr sz="1200">
+              <a:tabLst/>
+              <a:defRPr sz="1200" b="0">
                 <a:solidFill>
                   <a:schemeClr val="tx1"/>
                 </a:solidFill>
@@ -1373,10 +1386,26 @@
             </a:lvl1pPr>
           </a:lstStyle>
           <a:p>
-            <a:pPr algn="l"/>
+            <a:pPr marL="0" marR="0" lvl="0" indent="0" algn="l" defTabSz="457189" rtl="0" eaLnBrk="1" fontAlgn="auto" latinLnBrk="0" hangingPunct="1">
+              <a:lnSpc>
+                <a:spcPct val="100000"/>
+              </a:lnSpc>
+              <a:spcBef>
+                <a:spcPts val="0"/>
+              </a:spcBef>
+              <a:spcAft>
+                <a:spcPts val="0"/>
+              </a:spcAft>
+              <a:buClrTx/>
+              <a:buSzTx/>
+              <a:buFont typeface="Arial" panose="020B0604020202020204" pitchFamily="34" charset="0"/>
+              <a:buNone/>
+              <a:tabLst/>
+              <a:defRPr/>
+            </a:pPr>
             <a:r>
               <a:rPr lang="en-US" dirty="0"/>
-              <a:t>This OpenStax ancillary resource is © Rice University under a CC BY 4.0 International license; it may be reproduced or modified but must be attributed to OpenStax, Rice University and any changes must be noted.</a:t>
+              <a:t>This OpenStax ancillary resource is © Rice University under a CC BY-NC-SA 4.0 International license; it may be reproduced or modified but must be attributed to OpenStax, Rice University and any changes must be noted.</a:t>
             </a:r>
           </a:p>
         </p:txBody>
@@ -1412,7 +1441,7 @@
             <a:lvl1pPr algn="l">
               <a:defRPr sz="2800">
                 <a:solidFill>
-                  <a:srgbClr val="70AD47"/>
+                  <a:srgbClr val="548235"/>
                 </a:solidFill>
               </a:defRPr>
             </a:lvl1pPr>
@@ -1753,7 +1782,7 @@
             <a:lvl1pPr algn="l">
               <a:defRPr sz="2800">
                 <a:solidFill>
-                  <a:srgbClr val="70AD47"/>
+                  <a:srgbClr val="548235"/>
                 </a:solidFill>
               </a:defRPr>
             </a:lvl1pPr>
@@ -1881,7 +1910,7 @@
                   <a:noFill/>
                 </a:ln>
                 <a:solidFill>
-                  <a:srgbClr val="DB5935"/>
+                  <a:srgbClr val="D04925"/>
                 </a:solidFill>
                 <a:effectLst/>
                 <a:uLnTx/>
@@ -2072,7 +2101,7 @@
             <a:lvl1pPr algn="l">
               <a:defRPr sz="4000" b="1" cap="all">
                 <a:solidFill>
-                  <a:srgbClr val="70AD47"/>
+                  <a:srgbClr val="548235"/>
                 </a:solidFill>
               </a:defRPr>
             </a:lvl1pPr>
@@ -2396,7 +2425,7 @@
                   <a:noFill/>
                 </a:ln>
                 <a:solidFill>
-                  <a:srgbClr val="DB5935"/>
+                  <a:srgbClr val="D04925"/>
                 </a:solidFill>
                 <a:effectLst/>
                 <a:uLnTx/>
@@ -2625,7 +2654,7 @@
                   <a:noFill/>
                 </a:ln>
                 <a:solidFill>
-                  <a:srgbClr val="DB5935"/>
+                  <a:srgbClr val="D04925"/>
                 </a:solidFill>
                 <a:effectLst/>
                 <a:uLnTx/>
@@ -2761,7 +2790,7 @@
             <a:lvl1pPr algn="l">
               <a:defRPr sz="2800">
                 <a:solidFill>
-                  <a:srgbClr val="70AD47"/>
+                  <a:srgbClr val="548235"/>
                 </a:solidFill>
               </a:defRPr>
             </a:lvl1pPr>
@@ -3014,7 +3043,7 @@
                   <a:noFill/>
                 </a:ln>
                 <a:solidFill>
-                  <a:srgbClr val="DB5935"/>
+                  <a:srgbClr val="D04925"/>
                 </a:solidFill>
                 <a:effectLst/>
                 <a:uLnTx/>
@@ -3308,7 +3337,7 @@
                   <a:noFill/>
                 </a:ln>
                 <a:solidFill>
-                  <a:srgbClr val="DB5935"/>
+                  <a:srgbClr val="D04925"/>
                 </a:solidFill>
                 <a:effectLst/>
                 <a:uLnTx/>
@@ -3444,7 +3473,7 @@
             <a:lvl1pPr algn="l">
               <a:defRPr sz="2800">
                 <a:solidFill>
-                  <a:srgbClr val="70AD47"/>
+                  <a:srgbClr val="548235"/>
                 </a:solidFill>
               </a:defRPr>
             </a:lvl1pPr>
@@ -3537,7 +3566,7 @@
             <a:lvl1pPr algn="l">
               <a:defRPr sz="2800">
                 <a:solidFill>
-                  <a:srgbClr val="70AD47"/>
+                  <a:srgbClr val="548235"/>
                 </a:solidFill>
               </a:defRPr>
             </a:lvl1pPr>
@@ -3654,7 +3683,7 @@
             <a:lvl1pPr algn="l">
               <a:defRPr sz="2000" b="1">
                 <a:solidFill>
-                  <a:srgbClr val="70AD47"/>
+                  <a:srgbClr val="548235"/>
                 </a:solidFill>
               </a:defRPr>
             </a:lvl1pPr>
@@ -3810,7 +3839,7 @@
                   <a:noFill/>
                 </a:ln>
                 <a:solidFill>
-                  <a:srgbClr val="DB5935"/>
+                  <a:srgbClr val="D04925"/>
                 </a:solidFill>
                 <a:effectLst/>
                 <a:uLnTx/>
@@ -4324,7 +4353,7 @@
                   <a:noFill/>
                 </a:ln>
                 <a:solidFill>
-                  <a:srgbClr val="DB5935"/>
+                  <a:srgbClr val="D04925"/>
                 </a:solidFill>
                 <a:effectLst/>
                 <a:uLnTx/>
@@ -5088,7 +5117,7 @@
         <a:srgbClr val="609A33"/>
       </a:accent1>
       <a:accent2>
-        <a:srgbClr val="DB5935"/>
+        <a:srgbClr val="D04925"/>
       </a:accent2>
       <a:accent3>
         <a:srgbClr val="464846"/>
@@ -5100,7 +5129,7 @@
         <a:srgbClr val="1B1E3F"/>
       </a:accent5>
       <a:accent6>
-        <a:srgbClr val="70AD47"/>
+        <a:srgbClr val="548235"/>
       </a:accent6>
       <a:hlink>
         <a:srgbClr val="29749C"/>
@@ -5420,7 +5449,7 @@
         <a:srgbClr val="4472C4"/>
       </a:accent5>
       <a:accent6>
-        <a:srgbClr val="70AD47"/>
+        <a:srgbClr val="548235"/>
       </a:accent6>
       <a:hlink>
         <a:srgbClr val="0563C1"/>
@@ -5681,7 +5710,7 @@
         <a:srgbClr val="5B9BD5"/>
       </a:accent5>
       <a:accent6>
-        <a:srgbClr val="70AD47"/>
+        <a:srgbClr val="548235"/>
       </a:accent6>
       <a:hlink>
         <a:srgbClr val="0563C1"/>

</xml_diff>